<commit_message>
Fix ATNA process flow figures
</commit_message>
<xml_diff>
--- a/ITI/TF/Volume1/media/Figure_9.4.2.1-1.pptx
+++ b/ITI/TF/Volume1/media/Figure_9.4.2.1-1.pptx
@@ -104,6 +104,11 @@
       </a:defRPr>
     </a:lvl9pPr>
   </p:defaultTextStyle>
+  <p:extLst>
+    <p:ext uri="{EFAFB233-063F-42B5-8137-9DF3F51BA10A}">
+      <p15:sldGuideLst xmlns:p15="http://schemas.microsoft.com/office/powerpoint/2012/main"/>
+    </p:ext>
+  </p:extLst>
 </p:presentation>
 </file>
 
@@ -254,7 +259,7 @@
           <a:p>
             <a:fld id="{46B1D694-5BF2-8F45-A2F8-70CBC54E97B2}" type="datetimeFigureOut">
               <a:rPr lang="en-US" smtClean="0"/>
-              <a:t>8/10/20</a:t>
+              <a:t>8/26/20</a:t>
             </a:fld>
             <a:endParaRPr lang="en-US"/>
           </a:p>
@@ -452,7 +457,7 @@
           <a:p>
             <a:fld id="{46B1D694-5BF2-8F45-A2F8-70CBC54E97B2}" type="datetimeFigureOut">
               <a:rPr lang="en-US" smtClean="0"/>
-              <a:t>8/10/20</a:t>
+              <a:t>8/26/20</a:t>
             </a:fld>
             <a:endParaRPr lang="en-US"/>
           </a:p>
@@ -660,7 +665,7 @@
           <a:p>
             <a:fld id="{46B1D694-5BF2-8F45-A2F8-70CBC54E97B2}" type="datetimeFigureOut">
               <a:rPr lang="en-US" smtClean="0"/>
-              <a:t>8/10/20</a:t>
+              <a:t>8/26/20</a:t>
             </a:fld>
             <a:endParaRPr lang="en-US"/>
           </a:p>
@@ -858,7 +863,7 @@
           <a:p>
             <a:fld id="{46B1D694-5BF2-8F45-A2F8-70CBC54E97B2}" type="datetimeFigureOut">
               <a:rPr lang="en-US" smtClean="0"/>
-              <a:t>8/10/20</a:t>
+              <a:t>8/26/20</a:t>
             </a:fld>
             <a:endParaRPr lang="en-US"/>
           </a:p>
@@ -1133,7 +1138,7 @@
           <a:p>
             <a:fld id="{46B1D694-5BF2-8F45-A2F8-70CBC54E97B2}" type="datetimeFigureOut">
               <a:rPr lang="en-US" smtClean="0"/>
-              <a:t>8/10/20</a:t>
+              <a:t>8/26/20</a:t>
             </a:fld>
             <a:endParaRPr lang="en-US"/>
           </a:p>
@@ -1398,7 +1403,7 @@
           <a:p>
             <a:fld id="{46B1D694-5BF2-8F45-A2F8-70CBC54E97B2}" type="datetimeFigureOut">
               <a:rPr lang="en-US" smtClean="0"/>
-              <a:t>8/10/20</a:t>
+              <a:t>8/26/20</a:t>
             </a:fld>
             <a:endParaRPr lang="en-US"/>
           </a:p>
@@ -1810,7 +1815,7 @@
           <a:p>
             <a:fld id="{46B1D694-5BF2-8F45-A2F8-70CBC54E97B2}" type="datetimeFigureOut">
               <a:rPr lang="en-US" smtClean="0"/>
-              <a:t>8/10/20</a:t>
+              <a:t>8/26/20</a:t>
             </a:fld>
             <a:endParaRPr lang="en-US"/>
           </a:p>
@@ -1951,7 +1956,7 @@
           <a:p>
             <a:fld id="{46B1D694-5BF2-8F45-A2F8-70CBC54E97B2}" type="datetimeFigureOut">
               <a:rPr lang="en-US" smtClean="0"/>
-              <a:t>8/10/20</a:t>
+              <a:t>8/26/20</a:t>
             </a:fld>
             <a:endParaRPr lang="en-US"/>
           </a:p>
@@ -2064,7 +2069,7 @@
           <a:p>
             <a:fld id="{46B1D694-5BF2-8F45-A2F8-70CBC54E97B2}" type="datetimeFigureOut">
               <a:rPr lang="en-US" smtClean="0"/>
-              <a:t>8/10/20</a:t>
+              <a:t>8/26/20</a:t>
             </a:fld>
             <a:endParaRPr lang="en-US"/>
           </a:p>
@@ -2375,7 +2380,7 @@
           <a:p>
             <a:fld id="{46B1D694-5BF2-8F45-A2F8-70CBC54E97B2}" type="datetimeFigureOut">
               <a:rPr lang="en-US" smtClean="0"/>
-              <a:t>8/10/20</a:t>
+              <a:t>8/26/20</a:t>
             </a:fld>
             <a:endParaRPr lang="en-US"/>
           </a:p>
@@ -2663,7 +2668,7 @@
           <a:p>
             <a:fld id="{46B1D694-5BF2-8F45-A2F8-70CBC54E97B2}" type="datetimeFigureOut">
               <a:rPr lang="en-US" smtClean="0"/>
-              <a:t>8/10/20</a:t>
+              <a:t>8/26/20</a:t>
             </a:fld>
             <a:endParaRPr lang="en-US"/>
           </a:p>
@@ -2904,7 +2909,7 @@
           <a:p>
             <a:fld id="{46B1D694-5BF2-8F45-A2F8-70CBC54E97B2}" type="datetimeFigureOut">
               <a:rPr lang="en-US" smtClean="0"/>
-              <a:t>8/10/20</a:t>
+              <a:t>8/26/20</a:t>
             </a:fld>
             <a:endParaRPr lang="en-US"/>
           </a:p>
@@ -3323,6 +3328,133 @@
       </p:grpSpPr>
       <p:sp>
         <p:nvSpPr>
+          <p:cNvPr id="28" name="Text Box 9">
+            <a:extLst>
+              <a:ext uri="{FF2B5EF4-FFF2-40B4-BE49-F238E27FC236}">
+                <a16:creationId xmlns:a16="http://schemas.microsoft.com/office/drawing/2014/main" id="{77D7DC86-8364-8D4D-AEFC-64DD99448C32}"/>
+              </a:ext>
+            </a:extLst>
+          </p:cNvPr>
+          <p:cNvSpPr txBox="1">
+            <a:spLocks noChangeArrowheads="1"/>
+          </p:cNvSpPr>
+          <p:nvPr/>
+        </p:nvSpPr>
+        <p:spPr bwMode="auto">
+          <a:xfrm>
+            <a:off x="415554" y="4809659"/>
+            <a:ext cx="760413" cy="180975"/>
+          </a:xfrm>
+          <a:prstGeom prst="rect">
+            <a:avLst/>
+          </a:prstGeom>
+          <a:solidFill>
+            <a:srgbClr val="FFFFFF"/>
+          </a:solidFill>
+          <a:ln>
+            <a:noFill/>
+          </a:ln>
+          <a:extLst>
+            <a:ext uri="{91240B29-F687-4F45-9708-019B960494DF}">
+              <a14:hiddenLine xmlns:a14="http://schemas.microsoft.com/office/drawing/2010/main" w="9525">
+                <a:solidFill>
+                  <a:srgbClr val="000000"/>
+                </a:solidFill>
+                <a:miter lim="800000"/>
+                <a:headEnd/>
+                <a:tailEnd/>
+              </a14:hiddenLine>
+            </a:ext>
+          </a:extLst>
+        </p:spPr>
+        <p:txBody>
+          <a:bodyPr vert="horz" wrap="square" lIns="0" tIns="0" rIns="0" bIns="0" numCol="1" anchor="t" anchorCtr="0" compatLnSpc="1">
+            <a:prstTxWarp prst="textNoShape">
+              <a:avLst/>
+            </a:prstTxWarp>
+          </a:bodyPr>
+          <a:lstStyle/>
+          <a:p>
+            <a:pPr marL="0" marR="0" lvl="0" indent="0" algn="l" defTabSz="914400" rtl="0" eaLnBrk="0" fontAlgn="base" latinLnBrk="0" hangingPunct="0">
+              <a:lnSpc>
+                <a:spcPct val="100000"/>
+              </a:lnSpc>
+              <a:spcBef>
+                <a:spcPct val="0"/>
+              </a:spcBef>
+              <a:spcAft>
+                <a:spcPct val="0"/>
+              </a:spcAft>
+              <a:buClrTx/>
+              <a:buSzTx/>
+              <a:buFontTx/>
+              <a:buNone/>
+              <a:tabLst/>
+            </a:pPr>
+            <a:r>
+              <a:rPr kumimoji="0" lang="en-US" altLang="en-US" sz="1000" b="0" i="1" u="none" strike="noStrike" cap="none" normalizeH="0" baseline="0" dirty="0">
+                <a:ln>
+                  <a:noFill/>
+                </a:ln>
+                <a:solidFill>
+                  <a:schemeClr val="tx1"/>
+                </a:solidFill>
+                <a:effectLst/>
+                <a:latin typeface="Times New Roman" panose="02020603050405020304" pitchFamily="18" charset="0"/>
+                <a:ea typeface="Times New Roman" panose="02020603050405020304" pitchFamily="18" charset="0"/>
+                <a:cs typeface="Times New Roman" panose="02020603050405020304" pitchFamily="18" charset="0"/>
+              </a:rPr>
+              <a:t>View </a:t>
+            </a:r>
+          </a:p>
+          <a:p>
+            <a:pPr marL="0" marR="0" lvl="0" indent="0" algn="l" defTabSz="914400" rtl="0" eaLnBrk="0" fontAlgn="base" latinLnBrk="0" hangingPunct="0">
+              <a:lnSpc>
+                <a:spcPct val="100000"/>
+              </a:lnSpc>
+              <a:spcBef>
+                <a:spcPct val="0"/>
+              </a:spcBef>
+              <a:spcAft>
+                <a:spcPct val="0"/>
+              </a:spcAft>
+              <a:buClrTx/>
+              <a:buSzTx/>
+              <a:buFontTx/>
+              <a:buNone/>
+              <a:tabLst/>
+            </a:pPr>
+            <a:r>
+              <a:rPr kumimoji="0" lang="en-US" altLang="en-US" sz="1000" b="0" i="1" u="none" strike="noStrike" cap="none" normalizeH="0" baseline="0" dirty="0">
+                <a:ln>
+                  <a:noFill/>
+                </a:ln>
+                <a:solidFill>
+                  <a:schemeClr val="tx1"/>
+                </a:solidFill>
+                <a:effectLst/>
+                <a:latin typeface="Times New Roman" panose="02020603050405020304" pitchFamily="18" charset="0"/>
+                <a:ea typeface="Times New Roman" panose="02020603050405020304" pitchFamily="18" charset="0"/>
+                <a:cs typeface="Times New Roman" panose="02020603050405020304" pitchFamily="18" charset="0"/>
+              </a:rPr>
+              <a:t>Images</a:t>
+            </a:r>
+            <a:endParaRPr kumimoji="0" lang="en-US" altLang="en-US" sz="1800" b="0" i="0" u="none" strike="noStrike" cap="none" normalizeH="0" baseline="0" dirty="0">
+              <a:ln>
+                <a:noFill/>
+              </a:ln>
+              <a:solidFill>
+                <a:schemeClr val="tx1"/>
+              </a:solidFill>
+              <a:effectLst/>
+              <a:latin typeface="Times New Roman" panose="02020603050405020304" pitchFamily="18" charset="0"/>
+              <a:cs typeface="Times New Roman" panose="02020603050405020304" pitchFamily="18" charset="0"/>
+            </a:endParaRPr>
+          </a:p>
+        </p:txBody>
+      </p:sp>
+      <p:sp>
+        <p:nvSpPr>
           <p:cNvPr id="4" name="Line 33">
             <a:extLst>
               <a:ext uri="{FF2B5EF4-FFF2-40B4-BE49-F238E27FC236}">
@@ -3337,7 +3469,7 @@
         </p:nvSpPr>
         <p:spPr bwMode="auto">
           <a:xfrm flipV="1">
-            <a:off x="1284288" y="4667250"/>
+            <a:off x="1284288" y="4789911"/>
             <a:ext cx="2570162" cy="0"/>
           </a:xfrm>
           <a:prstGeom prst="line">
@@ -3368,7 +3500,10 @@
           </a:bodyPr>
           <a:lstStyle/>
           <a:p>
-            <a:endParaRPr lang="en-US"/>
+            <a:endParaRPr lang="en-US">
+              <a:latin typeface="Times New Roman" panose="02020603050405020304" pitchFamily="18" charset="0"/>
+              <a:cs typeface="Times New Roman" panose="02020603050405020304" pitchFamily="18" charset="0"/>
+            </a:endParaRPr>
           </a:p>
         </p:txBody>
       </p:sp>
@@ -3388,8 +3523,8 @@
         </p:nvSpPr>
         <p:spPr bwMode="auto">
           <a:xfrm flipH="1" flipV="1">
-            <a:off x="3924300" y="1011238"/>
-            <a:ext cx="38100" cy="5827712"/>
+            <a:off x="3921125" y="1599656"/>
+            <a:ext cx="41275" cy="5239293"/>
           </a:xfrm>
           <a:prstGeom prst="line">
             <a:avLst/>
@@ -3440,8 +3575,8 @@
         </p:nvSpPr>
         <p:spPr bwMode="auto">
           <a:xfrm flipH="1" flipV="1">
-            <a:off x="1171575" y="847725"/>
-            <a:ext cx="4763" cy="4760913"/>
+            <a:off x="1176337" y="1572319"/>
+            <a:ext cx="30163" cy="5239279"/>
           </a:xfrm>
           <a:prstGeom prst="line">
             <a:avLst/>
@@ -3492,7 +3627,7 @@
         </p:nvSpPr>
         <p:spPr bwMode="auto">
           <a:xfrm>
-            <a:off x="2117725" y="457200"/>
+            <a:off x="1771650" y="1127858"/>
             <a:ext cx="1082675" cy="449263"/>
           </a:xfrm>
           <a:prstGeom prst="rect">
@@ -3542,7 +3677,7 @@
               <a:tabLst/>
             </a:pPr>
             <a:r>
-              <a:rPr kumimoji="0" lang="en-US" altLang="en-US" sz="1000" b="0" i="0" u="none" strike="noStrike" cap="none" normalizeH="0" baseline="0">
+              <a:rPr kumimoji="0" lang="en-US" altLang="en-US" sz="1000" b="0" i="0" u="none" strike="noStrike" cap="none" normalizeH="0" baseline="0" dirty="0">
                 <a:ln>
                   <a:noFill/>
                 </a:ln>
@@ -3555,7 +3690,7 @@
               </a:rPr>
               <a:t>Image Manager/</a:t>
             </a:r>
-            <a:endParaRPr kumimoji="0" lang="en-US" altLang="en-US" sz="1000" b="0" i="0" u="none" strike="noStrike" cap="none" normalizeH="0" baseline="0">
+            <a:endParaRPr kumimoji="0" lang="en-US" altLang="en-US" sz="1000" b="0" i="0" u="none" strike="noStrike" cap="none" normalizeH="0" baseline="0" dirty="0">
               <a:ln>
                 <a:noFill/>
               </a:ln>
@@ -3584,7 +3719,7 @@
               <a:tabLst/>
             </a:pPr>
             <a:r>
-              <a:rPr kumimoji="0" lang="en-US" altLang="en-US" sz="1000" b="0" i="0" u="none" strike="noStrike" cap="none" normalizeH="0" baseline="0">
+              <a:rPr kumimoji="0" lang="en-US" altLang="en-US" sz="1000" b="0" i="0" u="none" strike="noStrike" cap="none" normalizeH="0" baseline="0" dirty="0">
                 <a:ln>
                   <a:noFill/>
                 </a:ln>
@@ -3597,7 +3732,7 @@
               </a:rPr>
               <a:t> Image Archive/</a:t>
             </a:r>
-            <a:endParaRPr kumimoji="0" lang="en-US" altLang="en-US" sz="1000" b="0" i="0" u="none" strike="noStrike" cap="none" normalizeH="0" baseline="0">
+            <a:endParaRPr kumimoji="0" lang="en-US" altLang="en-US" sz="1000" b="0" i="0" u="none" strike="noStrike" cap="none" normalizeH="0" baseline="0" dirty="0">
               <a:ln>
                 <a:noFill/>
               </a:ln>
@@ -3626,7 +3761,7 @@
               <a:tabLst/>
             </a:pPr>
             <a:r>
-              <a:rPr kumimoji="0" lang="en-US" altLang="en-US" sz="1000" b="0" i="0" u="none" strike="noStrike" cap="none" normalizeH="0" baseline="0">
+              <a:rPr kumimoji="0" lang="en-US" altLang="en-US" sz="1000" b="0" i="0" u="none" strike="noStrike" cap="none" normalizeH="0" baseline="0" dirty="0">
                 <a:ln>
                   <a:noFill/>
                 </a:ln>
@@ -3639,7 +3774,7 @@
               </a:rPr>
               <a:t>Secure Node</a:t>
             </a:r>
-            <a:endParaRPr kumimoji="0" lang="en-US" altLang="en-US" sz="1800" b="0" i="0" u="none" strike="noStrike" cap="none" normalizeH="0" baseline="0">
+            <a:endParaRPr kumimoji="0" lang="en-US" altLang="en-US" sz="1800" b="0" i="0" u="none" strike="noStrike" cap="none" normalizeH="0" baseline="0" dirty="0">
               <a:ln>
                 <a:noFill/>
               </a:ln>
@@ -3668,8 +3803,8 @@
         </p:nvSpPr>
         <p:spPr bwMode="auto">
           <a:xfrm flipH="1" flipV="1">
-            <a:off x="2332038" y="939800"/>
-            <a:ext cx="1587" cy="5972175"/>
+            <a:off x="2295525" y="1672681"/>
+            <a:ext cx="38100" cy="5239293"/>
           </a:xfrm>
           <a:prstGeom prst="line">
             <a:avLst/>
@@ -3720,7 +3855,7 @@
         </p:nvSpPr>
         <p:spPr bwMode="auto">
           <a:xfrm>
-            <a:off x="922338" y="468313"/>
+            <a:off x="753269" y="1214015"/>
             <a:ext cx="984250" cy="306387"/>
           </a:xfrm>
           <a:prstGeom prst="rect">
@@ -3854,7 +3989,7 @@
         </p:nvSpPr>
         <p:spPr bwMode="auto">
           <a:xfrm>
-            <a:off x="3344863" y="468313"/>
+            <a:off x="3217862" y="1114696"/>
             <a:ext cx="1266825" cy="469900"/>
           </a:xfrm>
           <a:prstGeom prst="rect">
@@ -3904,7 +4039,7 @@
               <a:tabLst/>
             </a:pPr>
             <a:r>
-              <a:rPr kumimoji="0" lang="en-US" altLang="en-US" sz="1000" b="0" i="0" u="none" strike="noStrike" cap="none" normalizeH="0" baseline="0">
+              <a:rPr kumimoji="0" lang="en-US" altLang="en-US" sz="1000" b="0" i="0" u="none" strike="noStrike" cap="none" normalizeH="0" baseline="0" dirty="0">
                 <a:ln>
                   <a:noFill/>
                 </a:ln>
@@ -3917,7 +4052,7 @@
               </a:rPr>
               <a:t>Audit Record Repository/</a:t>
             </a:r>
-            <a:endParaRPr kumimoji="0" lang="en-US" altLang="en-US" sz="1000" b="0" i="0" u="none" strike="noStrike" cap="none" normalizeH="0" baseline="0">
+            <a:endParaRPr kumimoji="0" lang="en-US" altLang="en-US" sz="1000" b="0" i="0" u="none" strike="noStrike" cap="none" normalizeH="0" baseline="0" dirty="0">
               <a:ln>
                 <a:noFill/>
               </a:ln>
@@ -3946,7 +4081,7 @@
               <a:tabLst/>
             </a:pPr>
             <a:r>
-              <a:rPr kumimoji="0" lang="en-US" altLang="en-US" sz="1000" b="0" i="0" u="none" strike="noStrike" cap="none" normalizeH="0" baseline="0">
+              <a:rPr kumimoji="0" lang="en-US" altLang="en-US" sz="1000" b="0" i="0" u="none" strike="noStrike" cap="none" normalizeH="0" baseline="0" dirty="0">
                 <a:ln>
                   <a:noFill/>
                 </a:ln>
@@ -3959,7 +4094,7 @@
               </a:rPr>
               <a:t>Secure Node</a:t>
             </a:r>
-            <a:endParaRPr kumimoji="0" lang="en-US" altLang="en-US" sz="1800" b="0" i="0" u="none" strike="noStrike" cap="none" normalizeH="0" baseline="0">
+            <a:endParaRPr kumimoji="0" lang="en-US" altLang="en-US" sz="1800" b="0" i="0" u="none" strike="noStrike" cap="none" normalizeH="0" baseline="0" dirty="0">
               <a:ln>
                 <a:noFill/>
               </a:ln>
@@ -4046,8 +4181,9 @@
                   <a:schemeClr val="tx1"/>
                 </a:solidFill>
                 <a:effectLst/>
-                <a:latin typeface="Arial" panose="020B0604020202020204" pitchFamily="34" charset="0"/>
+                <a:latin typeface="Times New Roman" panose="02020603050405020304" pitchFamily="18" charset="0"/>
                 <a:ea typeface="Times New Roman" panose="02020603050405020304" pitchFamily="18" charset="0"/>
+                <a:cs typeface="Times New Roman" panose="02020603050405020304" pitchFamily="18" charset="0"/>
               </a:rPr>
               <a:t>Record Audit Event [ITI-20]</a:t>
             </a:r>
@@ -4059,7 +4195,8 @@
                 <a:schemeClr val="tx1"/>
               </a:solidFill>
               <a:effectLst/>
-              <a:latin typeface="Arial" panose="020B0604020202020204" pitchFamily="34" charset="0"/>
+              <a:latin typeface="Times New Roman" panose="02020603050405020304" pitchFamily="18" charset="0"/>
+              <a:cs typeface="Times New Roman" panose="02020603050405020304" pitchFamily="18" charset="0"/>
             </a:endParaRPr>
           </a:p>
           <a:p>
@@ -4088,8 +4225,9 @@
                   <a:schemeClr val="tx1"/>
                 </a:solidFill>
                 <a:effectLst/>
-                <a:latin typeface="Arial" panose="020B0604020202020204" pitchFamily="34" charset="0"/>
+                <a:latin typeface="Times New Roman" panose="02020603050405020304" pitchFamily="18" charset="0"/>
                 <a:ea typeface="Times New Roman" panose="02020603050405020304" pitchFamily="18" charset="0"/>
+                <a:cs typeface="Times New Roman" panose="02020603050405020304" pitchFamily="18" charset="0"/>
               </a:rPr>
               <a:t>(User Authenticated)</a:t>
             </a:r>
@@ -4101,7 +4239,8 @@
                 <a:schemeClr val="tx1"/>
               </a:solidFill>
               <a:effectLst/>
-              <a:latin typeface="Arial" panose="020B0604020202020204" pitchFamily="34" charset="0"/>
+              <a:latin typeface="Times New Roman" panose="02020603050405020304" pitchFamily="18" charset="0"/>
+              <a:cs typeface="Times New Roman" panose="02020603050405020304" pitchFamily="18" charset="0"/>
             </a:endParaRPr>
           </a:p>
         </p:txBody>
@@ -4153,7 +4292,10 @@
           </a:bodyPr>
           <a:lstStyle/>
           <a:p>
-            <a:endParaRPr lang="en-US"/>
+            <a:endParaRPr lang="en-US">
+              <a:latin typeface="Times New Roman" panose="02020603050405020304" pitchFamily="18" charset="0"/>
+              <a:cs typeface="Times New Roman" panose="02020603050405020304" pitchFamily="18" charset="0"/>
+            </a:endParaRPr>
           </a:p>
         </p:txBody>
       </p:sp>
@@ -4231,8 +4373,9 @@
                   <a:schemeClr val="tx1"/>
                 </a:solidFill>
                 <a:effectLst/>
-                <a:latin typeface="Arial" panose="020B0604020202020204" pitchFamily="34" charset="0"/>
+                <a:latin typeface="Times New Roman" panose="02020603050405020304" pitchFamily="18" charset="0"/>
                 <a:ea typeface="Times New Roman" panose="02020603050405020304" pitchFamily="18" charset="0"/>
+                <a:cs typeface="Times New Roman" panose="02020603050405020304" pitchFamily="18" charset="0"/>
               </a:rPr>
               <a:t>Query Images</a:t>
             </a:r>
@@ -4244,7 +4387,8 @@
                 <a:schemeClr val="tx1"/>
               </a:solidFill>
               <a:effectLst/>
-              <a:latin typeface="Arial" panose="020B0604020202020204" pitchFamily="34" charset="0"/>
+              <a:latin typeface="Times New Roman" panose="02020603050405020304" pitchFamily="18" charset="0"/>
+              <a:cs typeface="Times New Roman" panose="02020603050405020304" pitchFamily="18" charset="0"/>
             </a:endParaRPr>
           </a:p>
         </p:txBody>
@@ -4291,7 +4435,10 @@
           </a:bodyPr>
           <a:lstStyle/>
           <a:p>
-            <a:endParaRPr lang="en-US"/>
+            <a:endParaRPr lang="en-US">
+              <a:latin typeface="Times New Roman" panose="02020603050405020304" pitchFamily="18" charset="0"/>
+              <a:cs typeface="Times New Roman" panose="02020603050405020304" pitchFamily="18" charset="0"/>
+            </a:endParaRPr>
           </a:p>
         </p:txBody>
       </p:sp>
@@ -4388,7 +4535,10 @@
           </a:bodyPr>
           <a:lstStyle/>
           <a:p>
-            <a:endParaRPr lang="en-US"/>
+            <a:endParaRPr lang="en-US">
+              <a:latin typeface="Times New Roman" panose="02020603050405020304" pitchFamily="18" charset="0"/>
+              <a:cs typeface="Times New Roman" panose="02020603050405020304" pitchFamily="18" charset="0"/>
+            </a:endParaRPr>
           </a:p>
         </p:txBody>
       </p:sp>
@@ -4408,8 +4558,8 @@
         </p:nvSpPr>
         <p:spPr bwMode="auto">
           <a:xfrm>
-            <a:off x="1101725" y="2857500"/>
-            <a:ext cx="184150" cy="2497138"/>
+            <a:off x="1101725" y="2857499"/>
+            <a:ext cx="177800" cy="2773841"/>
           </a:xfrm>
           <a:prstGeom prst="rect">
             <a:avLst/>
@@ -4434,7 +4584,10 @@
           </a:bodyPr>
           <a:lstStyle/>
           <a:p>
-            <a:endParaRPr lang="en-US"/>
+            <a:endParaRPr lang="en-US">
+              <a:latin typeface="Times New Roman" panose="02020603050405020304" pitchFamily="18" charset="0"/>
+              <a:cs typeface="Times New Roman" panose="02020603050405020304" pitchFamily="18" charset="0"/>
+            </a:endParaRPr>
           </a:p>
         </p:txBody>
       </p:sp>
@@ -4485,7 +4638,10 @@
           </a:bodyPr>
           <a:lstStyle/>
           <a:p>
-            <a:endParaRPr lang="en-US"/>
+            <a:endParaRPr lang="en-US">
+              <a:latin typeface="Times New Roman" panose="02020603050405020304" pitchFamily="18" charset="0"/>
+              <a:cs typeface="Times New Roman" panose="02020603050405020304" pitchFamily="18" charset="0"/>
+            </a:endParaRPr>
           </a:p>
         </p:txBody>
       </p:sp>
@@ -4536,7 +4692,10 @@
           </a:bodyPr>
           <a:lstStyle/>
           <a:p>
-            <a:endParaRPr lang="en-US"/>
+            <a:endParaRPr lang="en-US">
+              <a:latin typeface="Times New Roman" panose="02020603050405020304" pitchFamily="18" charset="0"/>
+              <a:cs typeface="Times New Roman" panose="02020603050405020304" pitchFamily="18" charset="0"/>
+            </a:endParaRPr>
           </a:p>
         </p:txBody>
       </p:sp>
@@ -4587,7 +4746,10 @@
           </a:bodyPr>
           <a:lstStyle/>
           <a:p>
-            <a:endParaRPr lang="en-US"/>
+            <a:endParaRPr lang="en-US">
+              <a:latin typeface="Times New Roman" panose="02020603050405020304" pitchFamily="18" charset="0"/>
+              <a:cs typeface="Times New Roman" panose="02020603050405020304" pitchFamily="18" charset="0"/>
+            </a:endParaRPr>
           </a:p>
         </p:txBody>
       </p:sp>
@@ -4638,7 +4800,10 @@
           </a:bodyPr>
           <a:lstStyle/>
           <a:p>
-            <a:endParaRPr lang="en-US"/>
+            <a:endParaRPr lang="en-US">
+              <a:latin typeface="Times New Roman" panose="02020603050405020304" pitchFamily="18" charset="0"/>
+              <a:cs typeface="Times New Roman" panose="02020603050405020304" pitchFamily="18" charset="0"/>
+            </a:endParaRPr>
           </a:p>
         </p:txBody>
       </p:sp>
@@ -4716,8 +4881,9 @@
                   <a:schemeClr val="tx1"/>
                 </a:solidFill>
                 <a:effectLst/>
-                <a:latin typeface="Arial" panose="020B0604020202020204" pitchFamily="34" charset="0"/>
+                <a:latin typeface="Times New Roman" panose="02020603050405020304" pitchFamily="18" charset="0"/>
                 <a:ea typeface="Times New Roman" panose="02020603050405020304" pitchFamily="18" charset="0"/>
+                <a:cs typeface="Times New Roman" panose="02020603050405020304" pitchFamily="18" charset="0"/>
               </a:rPr>
               <a:t>Retrieve Images</a:t>
             </a:r>
@@ -4729,7 +4895,8 @@
                 <a:schemeClr val="tx1"/>
               </a:solidFill>
               <a:effectLst/>
-              <a:latin typeface="Arial" panose="020B0604020202020204" pitchFamily="34" charset="0"/>
+              <a:latin typeface="Times New Roman" panose="02020603050405020304" pitchFamily="18" charset="0"/>
+              <a:cs typeface="Times New Roman" panose="02020603050405020304" pitchFamily="18" charset="0"/>
             </a:endParaRPr>
           </a:p>
         </p:txBody>
@@ -4781,7 +4948,10 @@
           </a:bodyPr>
           <a:lstStyle/>
           <a:p>
-            <a:endParaRPr lang="en-US"/>
+            <a:endParaRPr lang="en-US">
+              <a:latin typeface="Times New Roman" panose="02020603050405020304" pitchFamily="18" charset="0"/>
+              <a:cs typeface="Times New Roman" panose="02020603050405020304" pitchFamily="18" charset="0"/>
+            </a:endParaRPr>
           </a:p>
         </p:txBody>
       </p:sp>
@@ -4801,7 +4971,7 @@
         </p:nvSpPr>
         <p:spPr bwMode="auto">
           <a:xfrm>
-            <a:off x="2514600" y="2963863"/>
+            <a:off x="2514600" y="3053071"/>
             <a:ext cx="1127125" cy="544512"/>
           </a:xfrm>
           <a:prstGeom prst="rect">
@@ -4851,7 +5021,7 @@
               <a:tabLst/>
             </a:pPr>
             <a:r>
-              <a:rPr kumimoji="0" lang="en-US" altLang="en-US" sz="1000" b="0" i="0" u="none" strike="noStrike" cap="none" normalizeH="0" baseline="0">
+              <a:rPr kumimoji="0" lang="en-US" altLang="en-US" sz="1000" b="0" i="0" u="none" strike="noStrike" cap="none" normalizeH="0" baseline="0" dirty="0">
                 <a:ln>
                   <a:noFill/>
                 </a:ln>
@@ -4859,12 +5029,13 @@
                   <a:schemeClr val="tx1"/>
                 </a:solidFill>
                 <a:effectLst/>
-                <a:latin typeface="Arial" panose="020B0604020202020204" pitchFamily="34" charset="0"/>
+                <a:latin typeface="Times New Roman" panose="02020603050405020304" pitchFamily="18" charset="0"/>
                 <a:ea typeface="Times New Roman" panose="02020603050405020304" pitchFamily="18" charset="0"/>
+                <a:cs typeface="Times New Roman" panose="02020603050405020304" pitchFamily="18" charset="0"/>
               </a:rPr>
               <a:t>Record Audit Event [ITI-20]</a:t>
             </a:r>
-            <a:endParaRPr kumimoji="0" lang="en-US" altLang="en-US" sz="1000" b="0" i="0" u="none" strike="noStrike" cap="none" normalizeH="0" baseline="0">
+            <a:endParaRPr kumimoji="0" lang="en-US" altLang="en-US" sz="1000" b="0" i="0" u="none" strike="noStrike" cap="none" normalizeH="0" baseline="0" dirty="0">
               <a:ln>
                 <a:noFill/>
               </a:ln>
@@ -4872,7 +5043,8 @@
                 <a:schemeClr val="tx1"/>
               </a:solidFill>
               <a:effectLst/>
-              <a:latin typeface="Arial" panose="020B0604020202020204" pitchFamily="34" charset="0"/>
+              <a:latin typeface="Times New Roman" panose="02020603050405020304" pitchFamily="18" charset="0"/>
+              <a:cs typeface="Times New Roman" panose="02020603050405020304" pitchFamily="18" charset="0"/>
             </a:endParaRPr>
           </a:p>
           <a:p>
@@ -4893,7 +5065,7 @@
               <a:tabLst/>
             </a:pPr>
             <a:r>
-              <a:rPr kumimoji="0" lang="en-US" altLang="en-US" sz="1000" b="0" i="0" u="none" strike="noStrike" cap="none" normalizeH="0" baseline="0">
+              <a:rPr kumimoji="0" lang="en-US" altLang="en-US" sz="1000" b="0" i="0" u="none" strike="noStrike" cap="none" normalizeH="0" baseline="0" dirty="0">
                 <a:ln>
                   <a:noFill/>
                 </a:ln>
@@ -4901,12 +5073,13 @@
                   <a:schemeClr val="tx1"/>
                 </a:solidFill>
                 <a:effectLst/>
-                <a:latin typeface="Arial" panose="020B0604020202020204" pitchFamily="34" charset="0"/>
+                <a:latin typeface="Times New Roman" panose="02020603050405020304" pitchFamily="18" charset="0"/>
                 <a:ea typeface="Times New Roman" panose="02020603050405020304" pitchFamily="18" charset="0"/>
+                <a:cs typeface="Times New Roman" panose="02020603050405020304" pitchFamily="18" charset="0"/>
               </a:rPr>
               <a:t>(Query Images)</a:t>
             </a:r>
-            <a:endParaRPr kumimoji="0" lang="en-US" altLang="en-US" sz="1800" b="0" i="0" u="none" strike="noStrike" cap="none" normalizeH="0" baseline="0">
+            <a:endParaRPr kumimoji="0" lang="en-US" altLang="en-US" sz="1800" b="0" i="0" u="none" strike="noStrike" cap="none" normalizeH="0" baseline="0" dirty="0">
               <a:ln>
                 <a:noFill/>
               </a:ln>
@@ -4914,7 +5087,8 @@
                 <a:schemeClr val="tx1"/>
               </a:solidFill>
               <a:effectLst/>
-              <a:latin typeface="Arial" panose="020B0604020202020204" pitchFamily="34" charset="0"/>
+              <a:latin typeface="Times New Roman" panose="02020603050405020304" pitchFamily="18" charset="0"/>
+              <a:cs typeface="Times New Roman" panose="02020603050405020304" pitchFamily="18" charset="0"/>
             </a:endParaRPr>
           </a:p>
         </p:txBody>
@@ -4935,7 +5109,7 @@
         </p:nvSpPr>
         <p:spPr bwMode="auto">
           <a:xfrm flipH="1">
-            <a:off x="850900" y="4486275"/>
+            <a:off x="850900" y="4843113"/>
             <a:ext cx="252413" cy="0"/>
           </a:xfrm>
           <a:prstGeom prst="line">
@@ -4966,7 +5140,10 @@
           </a:bodyPr>
           <a:lstStyle/>
           <a:p>
-            <a:endParaRPr lang="en-US"/>
+            <a:endParaRPr lang="en-US">
+              <a:latin typeface="Times New Roman" panose="02020603050405020304" pitchFamily="18" charset="0"/>
+              <a:cs typeface="Times New Roman" panose="02020603050405020304" pitchFamily="18" charset="0"/>
+            </a:endParaRPr>
           </a:p>
         </p:txBody>
       </p:sp>
@@ -4986,7 +5163,7 @@
         </p:nvSpPr>
         <p:spPr bwMode="auto">
           <a:xfrm>
-            <a:off x="850900" y="4486275"/>
+            <a:off x="850900" y="4843113"/>
             <a:ext cx="0" cy="254000"/>
           </a:xfrm>
           <a:prstGeom prst="line">
@@ -5017,7 +5194,10 @@
           </a:bodyPr>
           <a:lstStyle/>
           <a:p>
-            <a:endParaRPr lang="en-US"/>
+            <a:endParaRPr lang="en-US">
+              <a:latin typeface="Times New Roman" panose="02020603050405020304" pitchFamily="18" charset="0"/>
+              <a:cs typeface="Times New Roman" panose="02020603050405020304" pitchFamily="18" charset="0"/>
+            </a:endParaRPr>
           </a:p>
         </p:txBody>
       </p:sp>
@@ -5037,7 +5217,7 @@
         </p:nvSpPr>
         <p:spPr bwMode="auto">
           <a:xfrm>
-            <a:off x="850900" y="4740275"/>
+            <a:off x="850900" y="5097113"/>
             <a:ext cx="288925" cy="0"/>
           </a:xfrm>
           <a:prstGeom prst="line">
@@ -5068,119 +5248,30 @@
           </a:bodyPr>
           <a:lstStyle/>
           <a:p>
-            <a:endParaRPr lang="en-US"/>
-          </a:p>
-        </p:txBody>
-      </p:sp>
-      <p:sp>
-        <p:nvSpPr>
-          <p:cNvPr id="28" name="Text Box 9">
-            <a:extLst>
-              <a:ext uri="{FF2B5EF4-FFF2-40B4-BE49-F238E27FC236}">
-                <a16:creationId xmlns:a16="http://schemas.microsoft.com/office/drawing/2014/main" id="{77D7DC86-8364-8D4D-AEFC-64DD99448C32}"/>
-              </a:ext>
-            </a:extLst>
-          </p:cNvPr>
-          <p:cNvSpPr txBox="1">
-            <a:spLocks noChangeArrowheads="1"/>
+            <a:endParaRPr lang="en-US">
+              <a:latin typeface="Times New Roman" panose="02020603050405020304" pitchFamily="18" charset="0"/>
+              <a:cs typeface="Times New Roman" panose="02020603050405020304" pitchFamily="18" charset="0"/>
+            </a:endParaRPr>
+          </a:p>
+        </p:txBody>
+      </p:sp>
+      <p:sp>
+        <p:nvSpPr>
+          <p:cNvPr id="29" name="Line 8">
+            <a:extLst>
+              <a:ext uri="{FF2B5EF4-FFF2-40B4-BE49-F238E27FC236}">
+                <a16:creationId xmlns:a16="http://schemas.microsoft.com/office/drawing/2014/main" id="{09BBDAD5-841A-4942-B36C-6914DDDA7D64}"/>
+              </a:ext>
+            </a:extLst>
+          </p:cNvPr>
+          <p:cNvSpPr>
+            <a:spLocks noChangeShapeType="1"/>
           </p:cNvSpPr>
           <p:nvPr/>
         </p:nvSpPr>
         <p:spPr bwMode="auto">
           <a:xfrm>
-            <a:off x="234950" y="4232275"/>
-            <a:ext cx="760413" cy="180975"/>
-          </a:xfrm>
-          <a:prstGeom prst="rect">
-            <a:avLst/>
-          </a:prstGeom>
-          <a:solidFill>
-            <a:srgbClr val="FFFFFF"/>
-          </a:solidFill>
-          <a:ln>
-            <a:noFill/>
-          </a:ln>
-          <a:extLst>
-            <a:ext uri="{91240B29-F687-4F45-9708-019B960494DF}">
-              <a14:hiddenLine xmlns:a14="http://schemas.microsoft.com/office/drawing/2010/main" w="9525">
-                <a:solidFill>
-                  <a:srgbClr val="000000"/>
-                </a:solidFill>
-                <a:miter lim="800000"/>
-                <a:headEnd/>
-                <a:tailEnd/>
-              </a14:hiddenLine>
-            </a:ext>
-          </a:extLst>
-        </p:spPr>
-        <p:txBody>
-          <a:bodyPr vert="horz" wrap="square" lIns="0" tIns="0" rIns="0" bIns="0" numCol="1" anchor="t" anchorCtr="0" compatLnSpc="1">
-            <a:prstTxWarp prst="textNoShape">
-              <a:avLst/>
-            </a:prstTxWarp>
-          </a:bodyPr>
-          <a:lstStyle/>
-          <a:p>
-            <a:pPr marL="0" marR="0" lvl="0" indent="0" algn="l" defTabSz="914400" rtl="0" eaLnBrk="0" fontAlgn="base" latinLnBrk="0" hangingPunct="0">
-              <a:lnSpc>
-                <a:spcPct val="100000"/>
-              </a:lnSpc>
-              <a:spcBef>
-                <a:spcPct val="0"/>
-              </a:spcBef>
-              <a:spcAft>
-                <a:spcPct val="0"/>
-              </a:spcAft>
-              <a:buClrTx/>
-              <a:buSzTx/>
-              <a:buFontTx/>
-              <a:buNone/>
-              <a:tabLst/>
-            </a:pPr>
-            <a:r>
-              <a:rPr kumimoji="0" lang="en-US" altLang="en-US" sz="1000" b="0" i="1" u="none" strike="noStrike" cap="none" normalizeH="0" baseline="0">
-                <a:ln>
-                  <a:noFill/>
-                </a:ln>
-                <a:solidFill>
-                  <a:schemeClr val="tx1"/>
-                </a:solidFill>
-                <a:effectLst/>
-                <a:latin typeface="Arial" panose="020B0604020202020204" pitchFamily="34" charset="0"/>
-                <a:ea typeface="Times New Roman" panose="02020603050405020304" pitchFamily="18" charset="0"/>
-              </a:rPr>
-              <a:t>View Images</a:t>
-            </a:r>
-            <a:endParaRPr kumimoji="0" lang="en-US" altLang="en-US" sz="1800" b="0" i="0" u="none" strike="noStrike" cap="none" normalizeH="0" baseline="0">
-              <a:ln>
-                <a:noFill/>
-              </a:ln>
-              <a:solidFill>
-                <a:schemeClr val="tx1"/>
-              </a:solidFill>
-              <a:effectLst/>
-              <a:latin typeface="Arial" panose="020B0604020202020204" pitchFamily="34" charset="0"/>
-            </a:endParaRPr>
-          </a:p>
-        </p:txBody>
-      </p:sp>
-      <p:sp>
-        <p:nvSpPr>
-          <p:cNvPr id="29" name="Line 8">
-            <a:extLst>
-              <a:ext uri="{FF2B5EF4-FFF2-40B4-BE49-F238E27FC236}">
-                <a16:creationId xmlns:a16="http://schemas.microsoft.com/office/drawing/2014/main" id="{09BBDAD5-841A-4942-B36C-6914DDDA7D64}"/>
-              </a:ext>
-            </a:extLst>
-          </p:cNvPr>
-          <p:cNvSpPr>
-            <a:spLocks noChangeShapeType="1"/>
-          </p:cNvSpPr>
-          <p:nvPr/>
-        </p:nvSpPr>
-        <p:spPr bwMode="auto">
-          <a:xfrm>
-            <a:off x="1284288" y="5246688"/>
+            <a:off x="1284288" y="5447406"/>
             <a:ext cx="2570162" cy="0"/>
           </a:xfrm>
           <a:prstGeom prst="line">
@@ -5211,53 +5302,10 @@
           </a:bodyPr>
           <a:lstStyle/>
           <a:p>
-            <a:endParaRPr lang="en-US"/>
-          </a:p>
-        </p:txBody>
-      </p:sp>
-      <p:sp>
-        <p:nvSpPr>
-          <p:cNvPr id="30" name="Rectangle 7">
-            <a:extLst>
-              <a:ext uri="{FF2B5EF4-FFF2-40B4-BE49-F238E27FC236}">
-                <a16:creationId xmlns:a16="http://schemas.microsoft.com/office/drawing/2014/main" id="{AFF2576D-8089-D542-92AC-48498AF70C20}"/>
-              </a:ext>
-            </a:extLst>
-          </p:cNvPr>
-          <p:cNvSpPr>
-            <a:spLocks noChangeArrowheads="1"/>
-          </p:cNvSpPr>
-          <p:nvPr/>
-        </p:nvSpPr>
-        <p:spPr bwMode="auto">
-          <a:xfrm>
-            <a:off x="2222500" y="2820988"/>
-            <a:ext cx="184150" cy="2533650"/>
-          </a:xfrm>
-          <a:prstGeom prst="rect">
-            <a:avLst/>
-          </a:prstGeom>
-          <a:solidFill>
-            <a:srgbClr val="FFFFFF"/>
-          </a:solidFill>
-          <a:ln w="9525">
-            <a:solidFill>
-              <a:srgbClr val="000000"/>
-            </a:solidFill>
-            <a:miter lim="800000"/>
-            <a:headEnd/>
-            <a:tailEnd/>
-          </a:ln>
-        </p:spPr>
-        <p:txBody>
-          <a:bodyPr vert="horz" wrap="square" lIns="91440" tIns="45720" rIns="91440" bIns="45720" numCol="1" anchor="t" anchorCtr="0" compatLnSpc="1">
-            <a:prstTxWarp prst="textNoShape">
-              <a:avLst/>
-            </a:prstTxWarp>
-          </a:bodyPr>
-          <a:lstStyle/>
-          <a:p>
-            <a:endParaRPr lang="en-US"/>
+            <a:endParaRPr lang="en-US">
+              <a:latin typeface="Times New Roman" panose="02020603050405020304" pitchFamily="18" charset="0"/>
+              <a:cs typeface="Times New Roman" panose="02020603050405020304" pitchFamily="18" charset="0"/>
+            </a:endParaRPr>
           </a:p>
         </p:txBody>
       </p:sp>
@@ -5335,8 +5383,9 @@
                   <a:schemeClr val="tx1"/>
                 </a:solidFill>
                 <a:effectLst/>
-                <a:latin typeface="Arial" panose="020B0604020202020204" pitchFamily="34" charset="0"/>
+                <a:latin typeface="Times New Roman" panose="02020603050405020304" pitchFamily="18" charset="0"/>
                 <a:ea typeface="Times New Roman" panose="02020603050405020304" pitchFamily="18" charset="0"/>
+                <a:cs typeface="Times New Roman" panose="02020603050405020304" pitchFamily="18" charset="0"/>
               </a:rPr>
               <a:t>Authenticate</a:t>
             </a:r>
@@ -5348,7 +5397,8 @@
                 <a:schemeClr val="tx1"/>
               </a:solidFill>
               <a:effectLst/>
-              <a:latin typeface="Arial" panose="020B0604020202020204" pitchFamily="34" charset="0"/>
+              <a:latin typeface="Times New Roman" panose="02020603050405020304" pitchFamily="18" charset="0"/>
+              <a:cs typeface="Times New Roman" panose="02020603050405020304" pitchFamily="18" charset="0"/>
             </a:endParaRPr>
           </a:p>
           <a:p>
@@ -5377,8 +5427,9 @@
                   <a:schemeClr val="tx1"/>
                 </a:solidFill>
                 <a:effectLst/>
-                <a:latin typeface="Arial" panose="020B0604020202020204" pitchFamily="34" charset="0"/>
+                <a:latin typeface="Times New Roman" panose="02020603050405020304" pitchFamily="18" charset="0"/>
                 <a:ea typeface="Times New Roman" panose="02020603050405020304" pitchFamily="18" charset="0"/>
+                <a:cs typeface="Times New Roman" panose="02020603050405020304" pitchFamily="18" charset="0"/>
               </a:rPr>
               <a:t>Node [ITI-19]</a:t>
             </a:r>
@@ -5390,7 +5441,8 @@
                 <a:schemeClr val="tx1"/>
               </a:solidFill>
               <a:effectLst/>
-              <a:latin typeface="Arial" panose="020B0604020202020204" pitchFamily="34" charset="0"/>
+              <a:latin typeface="Times New Roman" panose="02020603050405020304" pitchFamily="18" charset="0"/>
+              <a:cs typeface="Times New Roman" panose="02020603050405020304" pitchFamily="18" charset="0"/>
             </a:endParaRPr>
           </a:p>
         </p:txBody>
@@ -5442,7 +5494,10 @@
           </a:bodyPr>
           <a:lstStyle/>
           <a:p>
-            <a:endParaRPr lang="en-US"/>
+            <a:endParaRPr lang="en-US">
+              <a:latin typeface="Times New Roman" panose="02020603050405020304" pitchFamily="18" charset="0"/>
+              <a:cs typeface="Times New Roman" panose="02020603050405020304" pitchFamily="18" charset="0"/>
+            </a:endParaRPr>
           </a:p>
         </p:txBody>
       </p:sp>
@@ -5520,8 +5575,9 @@
                   <a:schemeClr val="tx1"/>
                 </a:solidFill>
                 <a:effectLst/>
-                <a:latin typeface="Arial" panose="020B0604020202020204" pitchFamily="34" charset="0"/>
+                <a:latin typeface="Times New Roman" panose="02020603050405020304" pitchFamily="18" charset="0"/>
                 <a:ea typeface="Times New Roman" panose="02020603050405020304" pitchFamily="18" charset="0"/>
+                <a:cs typeface="Times New Roman" panose="02020603050405020304" pitchFamily="18" charset="0"/>
               </a:rPr>
               <a:t>Record Audit Event [ITI-20]</a:t>
             </a:r>
@@ -5533,7 +5589,8 @@
                 <a:schemeClr val="tx1"/>
               </a:solidFill>
               <a:effectLst/>
-              <a:latin typeface="Arial" panose="020B0604020202020204" pitchFamily="34" charset="0"/>
+              <a:latin typeface="Times New Roman" panose="02020603050405020304" pitchFamily="18" charset="0"/>
+              <a:cs typeface="Times New Roman" panose="02020603050405020304" pitchFamily="18" charset="0"/>
             </a:endParaRPr>
           </a:p>
           <a:p>
@@ -5562,8 +5619,9 @@
                   <a:schemeClr val="tx1"/>
                 </a:solidFill>
                 <a:effectLst/>
-                <a:latin typeface="Arial" panose="020B0604020202020204" pitchFamily="34" charset="0"/>
+                <a:latin typeface="Times New Roman" panose="02020603050405020304" pitchFamily="18" charset="0"/>
                 <a:ea typeface="Times New Roman" panose="02020603050405020304" pitchFamily="18" charset="0"/>
+                <a:cs typeface="Times New Roman" panose="02020603050405020304" pitchFamily="18" charset="0"/>
               </a:rPr>
               <a:t>(Retrieve Images)</a:t>
             </a:r>
@@ -5575,7 +5633,8 @@
                 <a:schemeClr val="tx1"/>
               </a:solidFill>
               <a:effectLst/>
-              <a:latin typeface="Arial" panose="020B0604020202020204" pitchFamily="34" charset="0"/>
+              <a:latin typeface="Times New Roman" panose="02020603050405020304" pitchFamily="18" charset="0"/>
+              <a:cs typeface="Times New Roman" panose="02020603050405020304" pitchFamily="18" charset="0"/>
             </a:endParaRPr>
           </a:p>
         </p:txBody>
@@ -5627,7 +5686,10 @@
           </a:bodyPr>
           <a:lstStyle/>
           <a:p>
-            <a:endParaRPr lang="en-US"/>
+            <a:endParaRPr lang="en-US">
+              <a:latin typeface="Times New Roman" panose="02020603050405020304" pitchFamily="18" charset="0"/>
+              <a:cs typeface="Times New Roman" panose="02020603050405020304" pitchFamily="18" charset="0"/>
+            </a:endParaRPr>
           </a:p>
         </p:txBody>
       </p:sp>
@@ -5647,7 +5709,7 @@
         </p:nvSpPr>
         <p:spPr bwMode="auto">
           <a:xfrm>
-            <a:off x="1320800" y="4164013"/>
+            <a:off x="1320800" y="4286674"/>
             <a:ext cx="1127125" cy="430212"/>
           </a:xfrm>
           <a:prstGeom prst="rect">
@@ -5697,7 +5759,7 @@
               <a:tabLst/>
             </a:pPr>
             <a:r>
-              <a:rPr kumimoji="0" lang="en-US" altLang="en-US" sz="1000" b="0" i="0" u="none" strike="noStrike" cap="none" normalizeH="0" baseline="0">
+              <a:rPr kumimoji="0" lang="en-US" altLang="en-US" sz="1000" b="0" i="0" u="none" strike="noStrike" cap="none" normalizeH="0" baseline="0" dirty="0">
                 <a:ln>
                   <a:noFill/>
                 </a:ln>
@@ -5705,21 +5767,12 @@
                   <a:schemeClr val="tx1"/>
                 </a:solidFill>
                 <a:effectLst/>
-                <a:latin typeface="Arial" panose="020B0604020202020204" pitchFamily="34" charset="0"/>
+                <a:latin typeface="Times New Roman" panose="02020603050405020304" pitchFamily="18" charset="0"/>
                 <a:ea typeface="Times New Roman" panose="02020603050405020304" pitchFamily="18" charset="0"/>
+                <a:cs typeface="Times New Roman" panose="02020603050405020304" pitchFamily="18" charset="0"/>
               </a:rPr>
-              <a:t>Record Audit Event [ITI-20]</a:t>
-            </a:r>
-            <a:endParaRPr kumimoji="0" lang="en-US" altLang="en-US" sz="1000" b="0" i="0" u="none" strike="noStrike" cap="none" normalizeH="0" baseline="0">
-              <a:ln>
-                <a:noFill/>
-              </a:ln>
-              <a:solidFill>
-                <a:schemeClr val="tx1"/>
-              </a:solidFill>
-              <a:effectLst/>
-              <a:latin typeface="Arial" panose="020B0604020202020204" pitchFamily="34" charset="0"/>
-            </a:endParaRPr>
+              <a:t>Record Audit </a:t>
+            </a:r>
           </a:p>
           <a:p>
             <a:pPr marL="0" marR="0" lvl="0" indent="0" algn="l" defTabSz="914400" rtl="0" eaLnBrk="0" fontAlgn="base" latinLnBrk="0" hangingPunct="0">
@@ -5739,7 +5792,7 @@
               <a:tabLst/>
             </a:pPr>
             <a:r>
-              <a:rPr kumimoji="0" lang="en-US" altLang="en-US" sz="1000" b="0" i="0" u="none" strike="noStrike" cap="none" normalizeH="0" baseline="0">
+              <a:rPr kumimoji="0" lang="en-US" altLang="en-US" sz="1000" b="0" i="0" u="none" strike="noStrike" cap="none" normalizeH="0" baseline="0" dirty="0">
                 <a:ln>
                   <a:noFill/>
                 </a:ln>
@@ -5747,12 +5800,13 @@
                   <a:schemeClr val="tx1"/>
                 </a:solidFill>
                 <a:effectLst/>
-                <a:latin typeface="Arial" panose="020B0604020202020204" pitchFamily="34" charset="0"/>
+                <a:latin typeface="Times New Roman" panose="02020603050405020304" pitchFamily="18" charset="0"/>
                 <a:ea typeface="Times New Roman" panose="02020603050405020304" pitchFamily="18" charset="0"/>
+                <a:cs typeface="Times New Roman" panose="02020603050405020304" pitchFamily="18" charset="0"/>
               </a:rPr>
-              <a:t>(Retrieve Images)</a:t>
-            </a:r>
-            <a:endParaRPr kumimoji="0" lang="en-US" altLang="en-US" sz="1800" b="0" i="0" u="none" strike="noStrike" cap="none" normalizeH="0" baseline="0">
+              <a:t>Event [ITI-20]</a:t>
+            </a:r>
+            <a:endParaRPr kumimoji="0" lang="en-US" altLang="en-US" sz="1000" b="0" i="0" u="none" strike="noStrike" cap="none" normalizeH="0" baseline="0" dirty="0">
               <a:ln>
                 <a:noFill/>
               </a:ln>
@@ -5760,7 +5814,52 @@
                 <a:schemeClr val="tx1"/>
               </a:solidFill>
               <a:effectLst/>
-              <a:latin typeface="Arial" panose="020B0604020202020204" pitchFamily="34" charset="0"/>
+              <a:latin typeface="Times New Roman" panose="02020603050405020304" pitchFamily="18" charset="0"/>
+              <a:cs typeface="Times New Roman" panose="02020603050405020304" pitchFamily="18" charset="0"/>
+            </a:endParaRPr>
+          </a:p>
+          <a:p>
+            <a:pPr marL="0" marR="0" lvl="0" indent="0" algn="l" defTabSz="914400" rtl="0" eaLnBrk="0" fontAlgn="base" latinLnBrk="0" hangingPunct="0">
+              <a:lnSpc>
+                <a:spcPct val="100000"/>
+              </a:lnSpc>
+              <a:spcBef>
+                <a:spcPct val="0"/>
+              </a:spcBef>
+              <a:spcAft>
+                <a:spcPct val="0"/>
+              </a:spcAft>
+              <a:buClrTx/>
+              <a:buSzTx/>
+              <a:buFontTx/>
+              <a:buNone/>
+              <a:tabLst/>
+            </a:pPr>
+            <a:r>
+              <a:rPr kumimoji="0" lang="en-US" altLang="en-US" sz="1000" b="0" i="0" u="none" strike="noStrike" cap="none" normalizeH="0" baseline="0" dirty="0">
+                <a:ln>
+                  <a:noFill/>
+                </a:ln>
+                <a:solidFill>
+                  <a:schemeClr val="tx1"/>
+                </a:solidFill>
+                <a:effectLst/>
+                <a:latin typeface="Times New Roman" panose="02020603050405020304" pitchFamily="18" charset="0"/>
+                <a:ea typeface="Times New Roman" panose="02020603050405020304" pitchFamily="18" charset="0"/>
+                <a:cs typeface="Times New Roman" panose="02020603050405020304" pitchFamily="18" charset="0"/>
+              </a:rPr>
+              <a:t>(Retrieve Images)</a:t>
+            </a:r>
+            <a:endParaRPr kumimoji="0" lang="en-US" altLang="en-US" sz="1800" b="0" i="0" u="none" strike="noStrike" cap="none" normalizeH="0" baseline="0" dirty="0">
+              <a:ln>
+                <a:noFill/>
+              </a:ln>
+              <a:solidFill>
+                <a:schemeClr val="tx1"/>
+              </a:solidFill>
+              <a:effectLst/>
+              <a:latin typeface="Times New Roman" panose="02020603050405020304" pitchFamily="18" charset="0"/>
+              <a:cs typeface="Times New Roman" panose="02020603050405020304" pitchFamily="18" charset="0"/>
             </a:endParaRPr>
           </a:p>
         </p:txBody>
@@ -5781,7 +5880,7 @@
         </p:nvSpPr>
         <p:spPr bwMode="auto">
           <a:xfrm>
-            <a:off x="1320800" y="4716463"/>
+            <a:off x="1320800" y="4928332"/>
             <a:ext cx="1122363" cy="457200"/>
           </a:xfrm>
           <a:prstGeom prst="rect">
@@ -5831,7 +5930,7 @@
               <a:tabLst/>
             </a:pPr>
             <a:r>
-              <a:rPr kumimoji="0" lang="en-US" altLang="en-US" sz="1000" b="0" i="0" u="none" strike="noStrike" cap="none" normalizeH="0" baseline="0">
+              <a:rPr kumimoji="0" lang="en-US" altLang="en-US" sz="1000" b="0" i="0" u="none" strike="noStrike" cap="none" normalizeH="0" baseline="0" dirty="0">
                 <a:ln>
                   <a:noFill/>
                 </a:ln>
@@ -5839,21 +5938,12 @@
                   <a:schemeClr val="tx1"/>
                 </a:solidFill>
                 <a:effectLst/>
-                <a:latin typeface="Arial" panose="020B0604020202020204" pitchFamily="34" charset="0"/>
+                <a:latin typeface="Times New Roman" panose="02020603050405020304" pitchFamily="18" charset="0"/>
                 <a:ea typeface="Times New Roman" panose="02020603050405020304" pitchFamily="18" charset="0"/>
+                <a:cs typeface="Times New Roman" panose="02020603050405020304" pitchFamily="18" charset="0"/>
               </a:rPr>
-              <a:t>Record Audit Event [ITI-20]</a:t>
-            </a:r>
-            <a:endParaRPr kumimoji="0" lang="en-US" altLang="en-US" sz="1000" b="0" i="0" u="none" strike="noStrike" cap="none" normalizeH="0" baseline="0">
-              <a:ln>
-                <a:noFill/>
-              </a:ln>
-              <a:solidFill>
-                <a:schemeClr val="tx1"/>
-              </a:solidFill>
-              <a:effectLst/>
-              <a:latin typeface="Arial" panose="020B0604020202020204" pitchFamily="34" charset="0"/>
-            </a:endParaRPr>
+              <a:t>Record Audit </a:t>
+            </a:r>
           </a:p>
           <a:p>
             <a:pPr marL="0" marR="0" lvl="0" indent="0" algn="l" defTabSz="914400" rtl="0" eaLnBrk="0" fontAlgn="base" latinLnBrk="0" hangingPunct="0">
@@ -5873,7 +5963,7 @@
               <a:tabLst/>
             </a:pPr>
             <a:r>
-              <a:rPr kumimoji="0" lang="en-US" altLang="en-US" sz="1000" b="0" i="0" u="none" strike="noStrike" cap="none" normalizeH="0" baseline="0">
+              <a:rPr kumimoji="0" lang="en-US" altLang="en-US" sz="1000" b="0" i="0" u="none" strike="noStrike" cap="none" normalizeH="0" baseline="0" dirty="0">
                 <a:ln>
                   <a:noFill/>
                 </a:ln>
@@ -5881,12 +5971,13 @@
                   <a:schemeClr val="tx1"/>
                 </a:solidFill>
                 <a:effectLst/>
-                <a:latin typeface="Arial" panose="020B0604020202020204" pitchFamily="34" charset="0"/>
+                <a:latin typeface="Times New Roman" panose="02020603050405020304" pitchFamily="18" charset="0"/>
                 <a:ea typeface="Times New Roman" panose="02020603050405020304" pitchFamily="18" charset="0"/>
+                <a:cs typeface="Times New Roman" panose="02020603050405020304" pitchFamily="18" charset="0"/>
               </a:rPr>
-              <a:t>(Instances Used)</a:t>
-            </a:r>
-            <a:endParaRPr kumimoji="0" lang="en-US" altLang="en-US" sz="1800" b="0" i="0" u="none" strike="noStrike" cap="none" normalizeH="0" baseline="0">
+              <a:t>Event [ITI-20]</a:t>
+            </a:r>
+            <a:endParaRPr kumimoji="0" lang="en-US" altLang="en-US" sz="1000" b="0" i="0" u="none" strike="noStrike" cap="none" normalizeH="0" baseline="0" dirty="0">
               <a:ln>
                 <a:noFill/>
               </a:ln>
@@ -5894,7 +5985,52 @@
                 <a:schemeClr val="tx1"/>
               </a:solidFill>
               <a:effectLst/>
-              <a:latin typeface="Arial" panose="020B0604020202020204" pitchFamily="34" charset="0"/>
+              <a:latin typeface="Times New Roman" panose="02020603050405020304" pitchFamily="18" charset="0"/>
+              <a:cs typeface="Times New Roman" panose="02020603050405020304" pitchFamily="18" charset="0"/>
+            </a:endParaRPr>
+          </a:p>
+          <a:p>
+            <a:pPr marL="0" marR="0" lvl="0" indent="0" algn="l" defTabSz="914400" rtl="0" eaLnBrk="0" fontAlgn="base" latinLnBrk="0" hangingPunct="0">
+              <a:lnSpc>
+                <a:spcPct val="100000"/>
+              </a:lnSpc>
+              <a:spcBef>
+                <a:spcPct val="0"/>
+              </a:spcBef>
+              <a:spcAft>
+                <a:spcPct val="0"/>
+              </a:spcAft>
+              <a:buClrTx/>
+              <a:buSzTx/>
+              <a:buFontTx/>
+              <a:buNone/>
+              <a:tabLst/>
+            </a:pPr>
+            <a:r>
+              <a:rPr kumimoji="0" lang="en-US" altLang="en-US" sz="1000" b="0" i="0" u="none" strike="noStrike" cap="none" normalizeH="0" baseline="0" dirty="0">
+                <a:ln>
+                  <a:noFill/>
+                </a:ln>
+                <a:solidFill>
+                  <a:schemeClr val="tx1"/>
+                </a:solidFill>
+                <a:effectLst/>
+                <a:latin typeface="Times New Roman" panose="02020603050405020304" pitchFamily="18" charset="0"/>
+                <a:ea typeface="Times New Roman" panose="02020603050405020304" pitchFamily="18" charset="0"/>
+                <a:cs typeface="Times New Roman" panose="02020603050405020304" pitchFamily="18" charset="0"/>
+              </a:rPr>
+              <a:t>(Instances Used)</a:t>
+            </a:r>
+            <a:endParaRPr kumimoji="0" lang="en-US" altLang="en-US" sz="1800" b="0" i="0" u="none" strike="noStrike" cap="none" normalizeH="0" baseline="0" dirty="0">
+              <a:ln>
+                <a:noFill/>
+              </a:ln>
+              <a:solidFill>
+                <a:schemeClr val="tx1"/>
+              </a:solidFill>
+              <a:effectLst/>
+              <a:latin typeface="Times New Roman" panose="02020603050405020304" pitchFamily="18" charset="0"/>
+              <a:cs typeface="Times New Roman" panose="02020603050405020304" pitchFamily="18" charset="0"/>
             </a:endParaRPr>
           </a:p>
         </p:txBody>
@@ -5965,6 +6101,55 @@
           <a:lstStyle/>
           <a:p>
             <a:endParaRPr lang="en-US"/>
+          </a:p>
+        </p:txBody>
+      </p:sp>
+      <p:sp>
+        <p:nvSpPr>
+          <p:cNvPr id="30" name="Rectangle 7">
+            <a:extLst>
+              <a:ext uri="{FF2B5EF4-FFF2-40B4-BE49-F238E27FC236}">
+                <a16:creationId xmlns:a16="http://schemas.microsoft.com/office/drawing/2014/main" id="{AFF2576D-8089-D542-92AC-48498AF70C20}"/>
+              </a:ext>
+            </a:extLst>
+          </p:cNvPr>
+          <p:cNvSpPr>
+            <a:spLocks noChangeArrowheads="1"/>
+          </p:cNvSpPr>
+          <p:nvPr/>
+        </p:nvSpPr>
+        <p:spPr bwMode="auto">
+          <a:xfrm>
+            <a:off x="2228850" y="2820987"/>
+            <a:ext cx="177800" cy="2888431"/>
+          </a:xfrm>
+          <a:prstGeom prst="rect">
+            <a:avLst/>
+          </a:prstGeom>
+          <a:solidFill>
+            <a:srgbClr val="FFFFFF"/>
+          </a:solidFill>
+          <a:ln w="9525">
+            <a:solidFill>
+              <a:srgbClr val="000000"/>
+            </a:solidFill>
+            <a:miter lim="800000"/>
+            <a:headEnd/>
+            <a:tailEnd/>
+          </a:ln>
+        </p:spPr>
+        <p:txBody>
+          <a:bodyPr vert="horz" wrap="square" lIns="91440" tIns="45720" rIns="91440" bIns="45720" numCol="1" anchor="t" anchorCtr="0" compatLnSpc="1">
+            <a:prstTxWarp prst="textNoShape">
+              <a:avLst/>
+            </a:prstTxWarp>
+          </a:bodyPr>
+          <a:lstStyle/>
+          <a:p>
+            <a:endParaRPr lang="en-US">
+              <a:latin typeface="Times New Roman" panose="02020603050405020304" pitchFamily="18" charset="0"/>
+              <a:cs typeface="Times New Roman" panose="02020603050405020304" pitchFamily="18" charset="0"/>
+            </a:endParaRPr>
           </a:p>
         </p:txBody>
       </p:sp>

</xml_diff>